<commit_message>
Se agrego el modelo ER en los slides
</commit_message>
<xml_diff>
--- a/Sprint-2/DEMO2.pptx
+++ b/Sprint-2/DEMO2.pptx
@@ -5,7 +5,7 @@
     <p:sldMasterId id="2147483660" r:id="rId1"/>
   </p:sldMasterIdLst>
   <p:notesMasterIdLst>
-    <p:notesMasterId r:id="rId12"/>
+    <p:notesMasterId r:id="rId15"/>
   </p:notesMasterIdLst>
   <p:sldIdLst>
     <p:sldId id="351" r:id="rId2"/>
@@ -18,6 +18,9 @@
     <p:sldId id="261" r:id="rId9"/>
     <p:sldId id="262" r:id="rId10"/>
     <p:sldId id="264" r:id="rId11"/>
+    <p:sldId id="352" r:id="rId12"/>
+    <p:sldId id="353" r:id="rId13"/>
+    <p:sldId id="354" r:id="rId14"/>
   </p:sldIdLst>
   <p:sldSz cx="9144000" cy="5143500" type="screen16x9"/>
   <p:notesSz cx="6858000" cy="9144000"/>
@@ -4749,7 +4752,7 @@
             <a:fld id="{18D9E8F6-4D81-4B3A-BC45-BBA4A1C9BD0F}" type="datetimeFigureOut">
               <a:rPr lang="en-US" smtClean="0"/>
               <a:pPr/>
-              <a:t>3/16/2023</a:t>
+              <a:t>3/17/2023</a:t>
             </a:fld>
             <a:endParaRPr lang="en-US"/>
           </a:p>
@@ -9368,6 +9371,429 @@
 </p:sld>
 </file>
 
+<file path=ppt/slides/slide11.xml><?xml version="1.0" encoding="utf-8"?>
+<p:sld xmlns:a="http://schemas.openxmlformats.org/drawingml/2006/main" xmlns:r="http://schemas.openxmlformats.org/officeDocument/2006/relationships" xmlns:p="http://schemas.openxmlformats.org/presentationml/2006/main">
+  <p:cSld>
+    <p:spTree>
+      <p:nvGrpSpPr>
+        <p:cNvPr id="1" name=""/>
+        <p:cNvGrpSpPr/>
+        <p:nvPr/>
+      </p:nvGrpSpPr>
+      <p:grpSpPr>
+        <a:xfrm>
+          <a:off x="0" y="0"/>
+          <a:ext cx="0" cy="0"/>
+          <a:chOff x="0" y="0"/>
+          <a:chExt cx="0" cy="0"/>
+        </a:xfrm>
+      </p:grpSpPr>
+      <p:sp>
+        <p:nvSpPr>
+          <p:cNvPr id="3" name="Título 2">
+            <a:extLst>
+              <a:ext uri="{FF2B5EF4-FFF2-40B4-BE49-F238E27FC236}">
+                <a16:creationId xmlns:a16="http://schemas.microsoft.com/office/drawing/2014/main" id="{56EDCFFB-E466-E7FC-87C0-1606EFD7EBAF}"/>
+              </a:ext>
+            </a:extLst>
+          </p:cNvPr>
+          <p:cNvSpPr>
+            <a:spLocks noGrp="1"/>
+          </p:cNvSpPr>
+          <p:nvPr>
+            <p:ph type="title"/>
+          </p:nvPr>
+        </p:nvSpPr>
+        <p:spPr/>
+        <p:txBody>
+          <a:bodyPr/>
+          <a:lstStyle/>
+          <a:p>
+            <a:r>
+              <a:rPr lang="es-ES" dirty="0"/>
+              <a:t>BASES DE DATOS</a:t>
+            </a:r>
+          </a:p>
+        </p:txBody>
+      </p:sp>
+      <p:sp>
+        <p:nvSpPr>
+          <p:cNvPr id="4" name="Subtítulo 3">
+            <a:extLst>
+              <a:ext uri="{FF2B5EF4-FFF2-40B4-BE49-F238E27FC236}">
+                <a16:creationId xmlns:a16="http://schemas.microsoft.com/office/drawing/2014/main" id="{B3FA91E6-CFE3-134D-09F6-FB4F584DDB1C}"/>
+              </a:ext>
+            </a:extLst>
+          </p:cNvPr>
+          <p:cNvSpPr>
+            <a:spLocks noGrp="1"/>
+          </p:cNvSpPr>
+          <p:nvPr>
+            <p:ph type="subTitle" idx="2"/>
+          </p:nvPr>
+        </p:nvSpPr>
+        <p:spPr/>
+        <p:txBody>
+          <a:bodyPr/>
+          <a:lstStyle/>
+          <a:p>
+            <a:r>
+              <a:rPr lang="es-ES" dirty="0"/>
+              <a:t>UCI - COVENAR</a:t>
+            </a:r>
+          </a:p>
+        </p:txBody>
+      </p:sp>
+      <p:pic>
+        <p:nvPicPr>
+          <p:cNvPr id="6" name="Imagen 5">
+            <a:extLst>
+              <a:ext uri="{FF2B5EF4-FFF2-40B4-BE49-F238E27FC236}">
+                <a16:creationId xmlns:a16="http://schemas.microsoft.com/office/drawing/2014/main" id="{81C4B7E9-816C-667A-9474-99CF0E633747}"/>
+              </a:ext>
+            </a:extLst>
+          </p:cNvPr>
+          <p:cNvPicPr>
+            <a:picLocks noChangeAspect="1"/>
+          </p:cNvPicPr>
+          <p:nvPr/>
+        </p:nvPicPr>
+        <p:blipFill>
+          <a:blip r:embed="rId2"/>
+          <a:stretch>
+            <a:fillRect/>
+          </a:stretch>
+        </p:blipFill>
+        <p:spPr>
+          <a:xfrm>
+            <a:off x="1065833" y="1794644"/>
+            <a:ext cx="1689473" cy="2507876"/>
+          </a:xfrm>
+          <a:prstGeom prst="rect">
+            <a:avLst/>
+          </a:prstGeom>
+        </p:spPr>
+      </p:pic>
+      <p:pic>
+        <p:nvPicPr>
+          <p:cNvPr id="8" name="Imagen 7">
+            <a:extLst>
+              <a:ext uri="{FF2B5EF4-FFF2-40B4-BE49-F238E27FC236}">
+                <a16:creationId xmlns:a16="http://schemas.microsoft.com/office/drawing/2014/main" id="{60657A83-2156-31DB-2607-A9A9104B9C6C}"/>
+              </a:ext>
+            </a:extLst>
+          </p:cNvPr>
+          <p:cNvPicPr>
+            <a:picLocks noChangeAspect="1"/>
+          </p:cNvPicPr>
+          <p:nvPr/>
+        </p:nvPicPr>
+        <p:blipFill>
+          <a:blip r:embed="rId3"/>
+          <a:stretch>
+            <a:fillRect/>
+          </a:stretch>
+        </p:blipFill>
+        <p:spPr>
+          <a:xfrm>
+            <a:off x="4818752" y="2052029"/>
+            <a:ext cx="3543300" cy="1993107"/>
+          </a:xfrm>
+          <a:prstGeom prst="rect">
+            <a:avLst/>
+          </a:prstGeom>
+        </p:spPr>
+      </p:pic>
+      <p:sp>
+        <p:nvSpPr>
+          <p:cNvPr id="9" name="Flecha: a la derecha 8">
+            <a:extLst>
+              <a:ext uri="{FF2B5EF4-FFF2-40B4-BE49-F238E27FC236}">
+                <a16:creationId xmlns:a16="http://schemas.microsoft.com/office/drawing/2014/main" id="{1AC30EB6-5B2F-2347-D668-D71C7590942F}"/>
+              </a:ext>
+            </a:extLst>
+          </p:cNvPr>
+          <p:cNvSpPr/>
+          <p:nvPr/>
+        </p:nvSpPr>
+        <p:spPr>
+          <a:xfrm>
+            <a:off x="3350670" y="2780532"/>
+            <a:ext cx="1221330" cy="536100"/>
+          </a:xfrm>
+          <a:prstGeom prst="rightArrow">
+            <a:avLst/>
+          </a:prstGeom>
+          <a:solidFill>
+            <a:schemeClr val="dk1">
+              <a:alpha val="50000"/>
+            </a:schemeClr>
+          </a:solidFill>
+          <a:ln>
+            <a:noFill/>
+          </a:ln>
+        </p:spPr>
+        <p:style>
+          <a:lnRef idx="0">
+            <a:scrgbClr r="0" g="0" b="0"/>
+          </a:lnRef>
+          <a:fillRef idx="0">
+            <a:scrgbClr r="0" g="0" b="0"/>
+          </a:fillRef>
+          <a:effectRef idx="0">
+            <a:scrgbClr r="0" g="0" b="0"/>
+          </a:effectRef>
+          <a:fontRef idx="minor">
+            <a:schemeClr val="lt1"/>
+          </a:fontRef>
+        </p:style>
+        <p:txBody>
+          <a:bodyPr rtlCol="0" anchor="ctr"/>
+          <a:lstStyle/>
+          <a:p>
+            <a:pPr algn="ctr"/>
+            <a:endParaRPr lang="es-ES"/>
+          </a:p>
+        </p:txBody>
+      </p:sp>
+    </p:spTree>
+    <p:extLst>
+      <p:ext uri="{BB962C8B-B14F-4D97-AF65-F5344CB8AC3E}">
+        <p14:creationId xmlns:p14="http://schemas.microsoft.com/office/powerpoint/2010/main" val="1289186751"/>
+      </p:ext>
+    </p:extLst>
+  </p:cSld>
+  <p:clrMapOvr>
+    <a:masterClrMapping/>
+  </p:clrMapOvr>
+</p:sld>
+</file>
+
+<file path=ppt/slides/slide12.xml><?xml version="1.0" encoding="utf-8"?>
+<p:sld xmlns:a="http://schemas.openxmlformats.org/drawingml/2006/main" xmlns:r="http://schemas.openxmlformats.org/officeDocument/2006/relationships" xmlns:p="http://schemas.openxmlformats.org/presentationml/2006/main">
+  <p:cSld>
+    <p:spTree>
+      <p:nvGrpSpPr>
+        <p:cNvPr id="1" name=""/>
+        <p:cNvGrpSpPr/>
+        <p:nvPr/>
+      </p:nvGrpSpPr>
+      <p:grpSpPr>
+        <a:xfrm>
+          <a:off x="0" y="0"/>
+          <a:ext cx="0" cy="0"/>
+          <a:chOff x="0" y="0"/>
+          <a:chExt cx="0" cy="0"/>
+        </a:xfrm>
+      </p:grpSpPr>
+      <p:sp>
+        <p:nvSpPr>
+          <p:cNvPr id="3" name="Título 2">
+            <a:extLst>
+              <a:ext uri="{FF2B5EF4-FFF2-40B4-BE49-F238E27FC236}">
+                <a16:creationId xmlns:a16="http://schemas.microsoft.com/office/drawing/2014/main" id="{6A1AE036-A871-5B34-B3D4-C7FF8F8E630E}"/>
+              </a:ext>
+            </a:extLst>
+          </p:cNvPr>
+          <p:cNvSpPr>
+            <a:spLocks noGrp="1"/>
+          </p:cNvSpPr>
+          <p:nvPr>
+            <p:ph type="title"/>
+          </p:nvPr>
+        </p:nvSpPr>
+        <p:spPr/>
+        <p:txBody>
+          <a:bodyPr/>
+          <a:lstStyle/>
+          <a:p>
+            <a:r>
+              <a:rPr lang="es-ES" dirty="0"/>
+              <a:t>MODELO ENTIDAD RELACION</a:t>
+            </a:r>
+          </a:p>
+        </p:txBody>
+      </p:sp>
+      <p:sp>
+        <p:nvSpPr>
+          <p:cNvPr id="4" name="Subtítulo 3">
+            <a:extLst>
+              <a:ext uri="{FF2B5EF4-FFF2-40B4-BE49-F238E27FC236}">
+                <a16:creationId xmlns:a16="http://schemas.microsoft.com/office/drawing/2014/main" id="{6ECEFC58-B85C-9513-E776-43A975558FF7}"/>
+              </a:ext>
+            </a:extLst>
+          </p:cNvPr>
+          <p:cNvSpPr>
+            <a:spLocks noGrp="1"/>
+          </p:cNvSpPr>
+          <p:nvPr>
+            <p:ph type="subTitle" idx="2"/>
+          </p:nvPr>
+        </p:nvSpPr>
+        <p:spPr/>
+        <p:txBody>
+          <a:bodyPr/>
+          <a:lstStyle/>
+          <a:p>
+            <a:r>
+              <a:rPr lang="es-ES" dirty="0"/>
+              <a:t>UCI - COVENAR</a:t>
+            </a:r>
+          </a:p>
+        </p:txBody>
+      </p:sp>
+      <p:pic>
+        <p:nvPicPr>
+          <p:cNvPr id="6" name="Imagen 5">
+            <a:extLst>
+              <a:ext uri="{FF2B5EF4-FFF2-40B4-BE49-F238E27FC236}">
+                <a16:creationId xmlns:a16="http://schemas.microsoft.com/office/drawing/2014/main" id="{B83BF042-A7E8-FCB7-B8C8-FC2CFA84736C}"/>
+              </a:ext>
+            </a:extLst>
+          </p:cNvPr>
+          <p:cNvPicPr>
+            <a:picLocks noChangeAspect="1"/>
+          </p:cNvPicPr>
+          <p:nvPr/>
+        </p:nvPicPr>
+        <p:blipFill>
+          <a:blip r:embed="rId2"/>
+          <a:stretch>
+            <a:fillRect/>
+          </a:stretch>
+        </p:blipFill>
+        <p:spPr>
+          <a:xfrm>
+            <a:off x="147911" y="1419898"/>
+            <a:ext cx="8881780" cy="3419807"/>
+          </a:xfrm>
+          <a:prstGeom prst="rect">
+            <a:avLst/>
+          </a:prstGeom>
+        </p:spPr>
+      </p:pic>
+    </p:spTree>
+    <p:extLst>
+      <p:ext uri="{BB962C8B-B14F-4D97-AF65-F5344CB8AC3E}">
+        <p14:creationId xmlns:p14="http://schemas.microsoft.com/office/powerpoint/2010/main" val="2627192692"/>
+      </p:ext>
+    </p:extLst>
+  </p:cSld>
+  <p:clrMapOvr>
+    <a:masterClrMapping/>
+  </p:clrMapOvr>
+</p:sld>
+</file>
+
+<file path=ppt/slides/slide13.xml><?xml version="1.0" encoding="utf-8"?>
+<p:sld xmlns:a="http://schemas.openxmlformats.org/drawingml/2006/main" xmlns:r="http://schemas.openxmlformats.org/officeDocument/2006/relationships" xmlns:p="http://schemas.openxmlformats.org/presentationml/2006/main">
+  <p:cSld>
+    <p:spTree>
+      <p:nvGrpSpPr>
+        <p:cNvPr id="1" name=""/>
+        <p:cNvGrpSpPr/>
+        <p:nvPr/>
+      </p:nvGrpSpPr>
+      <p:grpSpPr>
+        <a:xfrm>
+          <a:off x="0" y="0"/>
+          <a:ext cx="0" cy="0"/>
+          <a:chOff x="0" y="0"/>
+          <a:chExt cx="0" cy="0"/>
+        </a:xfrm>
+      </p:grpSpPr>
+      <p:sp>
+        <p:nvSpPr>
+          <p:cNvPr id="2" name="Marcador de texto 1">
+            <a:extLst>
+              <a:ext uri="{FF2B5EF4-FFF2-40B4-BE49-F238E27FC236}">
+                <a16:creationId xmlns:a16="http://schemas.microsoft.com/office/drawing/2014/main" id="{D90FFE17-078D-C8D3-A530-4E21994EDF84}"/>
+              </a:ext>
+            </a:extLst>
+          </p:cNvPr>
+          <p:cNvSpPr>
+            <a:spLocks noGrp="1"/>
+          </p:cNvSpPr>
+          <p:nvPr>
+            <p:ph type="body" idx="1"/>
+          </p:nvPr>
+        </p:nvSpPr>
+        <p:spPr>
+          <a:xfrm>
+            <a:off x="1991845" y="2571750"/>
+            <a:ext cx="5160309" cy="826117"/>
+          </a:xfrm>
+        </p:spPr>
+        <p:txBody>
+          <a:bodyPr>
+            <a:normAutofit lnSpcReduction="10000"/>
+          </a:bodyPr>
+          <a:lstStyle/>
+          <a:p>
+            <a:pPr marL="57150" indent="0">
+              <a:buNone/>
+            </a:pPr>
+            <a:r>
+              <a:rPr lang="en-US" sz="4800" dirty="0" err="1">
+                <a:solidFill>
+                  <a:schemeClr val="tx1"/>
+                </a:solidFill>
+              </a:rPr>
+              <a:t>Muchas</a:t>
+            </a:r>
+            <a:r>
+              <a:rPr lang="en-US" sz="4800" dirty="0">
+                <a:solidFill>
+                  <a:schemeClr val="tx1"/>
+                </a:solidFill>
+              </a:rPr>
+              <a:t> Gracias!!!</a:t>
+            </a:r>
+          </a:p>
+        </p:txBody>
+      </p:sp>
+      <p:sp>
+        <p:nvSpPr>
+          <p:cNvPr id="3" name="Título 2">
+            <a:extLst>
+              <a:ext uri="{FF2B5EF4-FFF2-40B4-BE49-F238E27FC236}">
+                <a16:creationId xmlns:a16="http://schemas.microsoft.com/office/drawing/2014/main" id="{F0BF8ED9-34E4-47B6-98E5-17D19737F77B}"/>
+              </a:ext>
+            </a:extLst>
+          </p:cNvPr>
+          <p:cNvSpPr>
+            <a:spLocks noGrp="1"/>
+          </p:cNvSpPr>
+          <p:nvPr>
+            <p:ph type="title"/>
+          </p:nvPr>
+        </p:nvSpPr>
+        <p:spPr/>
+        <p:txBody>
+          <a:bodyPr/>
+          <a:lstStyle/>
+          <a:p>
+            <a:pPr algn="ctr"/>
+            <a:r>
+              <a:rPr lang="es-ES" dirty="0"/>
+              <a:t>UCI - COVENAR</a:t>
+            </a:r>
+          </a:p>
+        </p:txBody>
+      </p:sp>
+    </p:spTree>
+    <p:extLst>
+      <p:ext uri="{BB962C8B-B14F-4D97-AF65-F5344CB8AC3E}">
+        <p14:creationId xmlns:p14="http://schemas.microsoft.com/office/powerpoint/2010/main" val="2464923745"/>
+      </p:ext>
+    </p:extLst>
+  </p:cSld>
+  <p:clrMapOvr>
+    <a:masterClrMapping/>
+  </p:clrMapOvr>
+</p:sld>
+</file>
+
 <file path=ppt/slides/slide2.xml><?xml version="1.0" encoding="utf-8"?>
 <p:sld xmlns:a="http://schemas.openxmlformats.org/drawingml/2006/main" xmlns:r="http://schemas.openxmlformats.org/officeDocument/2006/relationships" xmlns:p="http://schemas.openxmlformats.org/presentationml/2006/main">
   <p:cSld>

</xml_diff>